<commit_message>
Add interface.py for sampling to dictionary
</commit_message>
<xml_diff>
--- a/Regression_test/Stochastic_TESS_Slide1.pptx
+++ b/Regression_test/Stochastic_TESS_Slide1.pptx
@@ -5,17 +5,18 @@
     <p:sldMasterId id="2147483648" r:id="rId1"/>
   </p:sldMasterIdLst>
   <p:notesMasterIdLst>
-    <p:notesMasterId r:id="rId10"/>
+    <p:notesMasterId r:id="rId11"/>
   </p:notesMasterIdLst>
   <p:sldIdLst>
     <p:sldId id="265" r:id="rId2"/>
-    <p:sldId id="274" r:id="rId3"/>
-    <p:sldId id="275" r:id="rId4"/>
-    <p:sldId id="266" r:id="rId5"/>
-    <p:sldId id="268" r:id="rId6"/>
-    <p:sldId id="270" r:id="rId7"/>
-    <p:sldId id="272" r:id="rId8"/>
-    <p:sldId id="273" r:id="rId9"/>
+    <p:sldId id="276" r:id="rId3"/>
+    <p:sldId id="274" r:id="rId4"/>
+    <p:sldId id="275" r:id="rId5"/>
+    <p:sldId id="266" r:id="rId6"/>
+    <p:sldId id="268" r:id="rId7"/>
+    <p:sldId id="270" r:id="rId8"/>
+    <p:sldId id="272" r:id="rId9"/>
+    <p:sldId id="273" r:id="rId10"/>
   </p:sldIdLst>
   <p:sldSz cx="12192000" cy="6858000"/>
   <p:notesSz cx="6858000" cy="9144000"/>
@@ -120,6 +121,7 @@
         <p14:section name="Default Section" id="{009F0B05-83FD-B440-AF52-DE1C13C524F2}">
           <p14:sldIdLst>
             <p14:sldId id="265"/>
+            <p14:sldId id="276"/>
             <p14:sldId id="274"/>
             <p14:sldId id="275"/>
           </p14:sldIdLst>
@@ -415,7 +417,7 @@
           <a:p>
             <a:fld id="{F1832CD3-83DA-8243-8BF7-90F13AE3AA19}" type="datetimeFigureOut">
               <a:rPr lang="en-US" smtClean="0"/>
-              <a:t>6/9/22</a:t>
+              <a:t>6/17/22</a:t>
             </a:fld>
             <a:endParaRPr lang="en-US"/>
           </a:p>
@@ -810,6 +812,90 @@
           <a:bodyPr/>
           <a:lstStyle/>
           <a:p>
+            <a:endParaRPr lang="en-US" dirty="0"/>
+          </a:p>
+        </p:txBody>
+      </p:sp>
+      <p:sp>
+        <p:nvSpPr>
+          <p:cNvPr id="4" name="Slide Number Placeholder 3"/>
+          <p:cNvSpPr>
+            <a:spLocks noGrp="1"/>
+          </p:cNvSpPr>
+          <p:nvPr>
+            <p:ph type="sldNum" sz="quarter" idx="5"/>
+          </p:nvPr>
+        </p:nvSpPr>
+        <p:spPr/>
+        <p:txBody>
+          <a:bodyPr/>
+          <a:lstStyle/>
+          <a:p>
+            <a:fld id="{A068F177-7166-3248-A1D4-0C3B4A4A645D}" type="slidenum">
+              <a:rPr lang="en-US" smtClean="0"/>
+              <a:t>2</a:t>
+            </a:fld>
+            <a:endParaRPr lang="en-US"/>
+          </a:p>
+        </p:txBody>
+      </p:sp>
+    </p:spTree>
+    <p:extLst>
+      <p:ext uri="{BB962C8B-B14F-4D97-AF65-F5344CB8AC3E}">
+        <p14:creationId xmlns:p14="http://schemas.microsoft.com/office/powerpoint/2010/main" val="2466657459"/>
+      </p:ext>
+    </p:extLst>
+  </p:cSld>
+  <p:clrMapOvr>
+    <a:masterClrMapping/>
+  </p:clrMapOvr>
+</p:notes>
+</file>
+
+<file path=ppt/notesSlides/notesSlide3.xml><?xml version="1.0" encoding="utf-8"?>
+<p:notes xmlns:a="http://schemas.openxmlformats.org/drawingml/2006/main" xmlns:r="http://schemas.openxmlformats.org/officeDocument/2006/relationships" xmlns:p="http://schemas.openxmlformats.org/presentationml/2006/main">
+  <p:cSld>
+    <p:spTree>
+      <p:nvGrpSpPr>
+        <p:cNvPr id="1" name=""/>
+        <p:cNvGrpSpPr/>
+        <p:nvPr/>
+      </p:nvGrpSpPr>
+      <p:grpSpPr>
+        <a:xfrm>
+          <a:off x="0" y="0"/>
+          <a:ext cx="0" cy="0"/>
+          <a:chOff x="0" y="0"/>
+          <a:chExt cx="0" cy="0"/>
+        </a:xfrm>
+      </p:grpSpPr>
+      <p:sp>
+        <p:nvSpPr>
+          <p:cNvPr id="2" name="Slide Image Placeholder 1"/>
+          <p:cNvSpPr>
+            <a:spLocks noGrp="1" noRot="1" noChangeAspect="1"/>
+          </p:cNvSpPr>
+          <p:nvPr>
+            <p:ph type="sldImg"/>
+          </p:nvPr>
+        </p:nvSpPr>
+        <p:spPr/>
+      </p:sp>
+      <p:sp>
+        <p:nvSpPr>
+          <p:cNvPr id="3" name="Notes Placeholder 2"/>
+          <p:cNvSpPr>
+            <a:spLocks noGrp="1"/>
+          </p:cNvSpPr>
+          <p:nvPr>
+            <p:ph type="body" idx="1"/>
+          </p:nvPr>
+        </p:nvSpPr>
+        <p:spPr/>
+        <p:txBody>
+          <a:bodyPr/>
+          <a:lstStyle/>
+          <a:p>
             <a:r>
               <a:rPr lang="en-US" dirty="0"/>
               <a:t>Uncontrollable Power</a:t>
@@ -834,7 +920,7 @@
           <a:p>
             <a:fld id="{A068F177-7166-3248-A1D4-0C3B4A4A645D}" type="slidenum">
               <a:rPr lang="en-US" smtClean="0"/>
-              <a:t>4</a:t>
+              <a:t>5</a:t>
             </a:fld>
             <a:endParaRPr lang="en-US"/>
           </a:p>
@@ -1000,7 +1086,7 @@
           <a:p>
             <a:fld id="{64EB3368-087A-0E47-98AF-F2EF18AAB058}" type="datetimeFigureOut">
               <a:rPr lang="en-US" smtClean="0"/>
-              <a:t>6/9/22</a:t>
+              <a:t>6/17/22</a:t>
             </a:fld>
             <a:endParaRPr lang="en-US"/>
           </a:p>
@@ -1198,7 +1284,7 @@
           <a:p>
             <a:fld id="{64EB3368-087A-0E47-98AF-F2EF18AAB058}" type="datetimeFigureOut">
               <a:rPr lang="en-US" smtClean="0"/>
-              <a:t>6/9/22</a:t>
+              <a:t>6/17/22</a:t>
             </a:fld>
             <a:endParaRPr lang="en-US"/>
           </a:p>
@@ -1406,7 +1492,7 @@
           <a:p>
             <a:fld id="{64EB3368-087A-0E47-98AF-F2EF18AAB058}" type="datetimeFigureOut">
               <a:rPr lang="en-US" smtClean="0"/>
-              <a:t>6/9/22</a:t>
+              <a:t>6/17/22</a:t>
             </a:fld>
             <a:endParaRPr lang="en-US"/>
           </a:p>
@@ -1604,7 +1690,7 @@
           <a:p>
             <a:fld id="{64EB3368-087A-0E47-98AF-F2EF18AAB058}" type="datetimeFigureOut">
               <a:rPr lang="en-US" smtClean="0"/>
-              <a:t>6/9/22</a:t>
+              <a:t>6/17/22</a:t>
             </a:fld>
             <a:endParaRPr lang="en-US"/>
           </a:p>
@@ -1879,7 +1965,7 @@
           <a:p>
             <a:fld id="{64EB3368-087A-0E47-98AF-F2EF18AAB058}" type="datetimeFigureOut">
               <a:rPr lang="en-US" smtClean="0"/>
-              <a:t>6/9/22</a:t>
+              <a:t>6/17/22</a:t>
             </a:fld>
             <a:endParaRPr lang="en-US"/>
           </a:p>
@@ -2144,7 +2230,7 @@
           <a:p>
             <a:fld id="{64EB3368-087A-0E47-98AF-F2EF18AAB058}" type="datetimeFigureOut">
               <a:rPr lang="en-US" smtClean="0"/>
-              <a:t>6/9/22</a:t>
+              <a:t>6/17/22</a:t>
             </a:fld>
             <a:endParaRPr lang="en-US"/>
           </a:p>
@@ -2556,7 +2642,7 @@
           <a:p>
             <a:fld id="{64EB3368-087A-0E47-98AF-F2EF18AAB058}" type="datetimeFigureOut">
               <a:rPr lang="en-US" smtClean="0"/>
-              <a:t>6/9/22</a:t>
+              <a:t>6/17/22</a:t>
             </a:fld>
             <a:endParaRPr lang="en-US"/>
           </a:p>
@@ -2697,7 +2783,7 @@
           <a:p>
             <a:fld id="{64EB3368-087A-0E47-98AF-F2EF18AAB058}" type="datetimeFigureOut">
               <a:rPr lang="en-US" smtClean="0"/>
-              <a:t>6/9/22</a:t>
+              <a:t>6/17/22</a:t>
             </a:fld>
             <a:endParaRPr lang="en-US"/>
           </a:p>
@@ -2810,7 +2896,7 @@
           <a:p>
             <a:fld id="{64EB3368-087A-0E47-98AF-F2EF18AAB058}" type="datetimeFigureOut">
               <a:rPr lang="en-US" smtClean="0"/>
-              <a:t>6/9/22</a:t>
+              <a:t>6/17/22</a:t>
             </a:fld>
             <a:endParaRPr lang="en-US"/>
           </a:p>
@@ -3121,7 +3207,7 @@
           <a:p>
             <a:fld id="{64EB3368-087A-0E47-98AF-F2EF18AAB058}" type="datetimeFigureOut">
               <a:rPr lang="en-US" smtClean="0"/>
-              <a:t>6/9/22</a:t>
+              <a:t>6/17/22</a:t>
             </a:fld>
             <a:endParaRPr lang="en-US"/>
           </a:p>
@@ -3409,7 +3495,7 @@
           <a:p>
             <a:fld id="{64EB3368-087A-0E47-98AF-F2EF18AAB058}" type="datetimeFigureOut">
               <a:rPr lang="en-US" smtClean="0"/>
-              <a:t>6/9/22</a:t>
+              <a:t>6/17/22</a:t>
             </a:fld>
             <a:endParaRPr lang="en-US"/>
           </a:p>
@@ -3650,7 +3736,7 @@
           <a:p>
             <a:fld id="{64EB3368-087A-0E47-98AF-F2EF18AAB058}" type="datetimeFigureOut">
               <a:rPr lang="en-US" smtClean="0"/>
-              <a:t>6/9/22</a:t>
+              <a:t>6/17/22</a:t>
             </a:fld>
             <a:endParaRPr lang="en-US"/>
           </a:p>
@@ -4100,8 +4186,8 @@
           </a:p>
         </p:txBody>
       </p:sp>
-      <mc:AlternateContent xmlns:mc="http://schemas.openxmlformats.org/markup-compatibility/2006">
-        <mc:Choice xmlns:a14="http://schemas.microsoft.com/office/drawing/2010/main" Requires="a14">
+      <mc:AlternateContent xmlns:mc="http://schemas.openxmlformats.org/markup-compatibility/2006" xmlns:a14="http://schemas.microsoft.com/office/drawing/2010/main">
+        <mc:Choice Requires="a14">
           <p:sp>
             <p:nvSpPr>
               <p:cNvPr id="3" name="Content Placeholder 2">
@@ -6783,7 +6869,7 @@
             </p:txBody>
           </p:sp>
         </mc:Choice>
-        <mc:Fallback>
+        <mc:Fallback xmlns="">
           <p:sp>
             <p:nvSpPr>
               <p:cNvPr id="3" name="Content Placeholder 2">
@@ -6841,6 +6927,1827 @@
 </file>
 
 <file path=ppt/slides/slide2.xml><?xml version="1.0" encoding="utf-8"?>
+<p:sld xmlns:a="http://schemas.openxmlformats.org/drawingml/2006/main" xmlns:r="http://schemas.openxmlformats.org/officeDocument/2006/relationships" xmlns:p="http://schemas.openxmlformats.org/presentationml/2006/main">
+  <p:cSld>
+    <p:spTree>
+      <p:nvGrpSpPr>
+        <p:cNvPr id="1" name=""/>
+        <p:cNvGrpSpPr/>
+        <p:nvPr/>
+      </p:nvGrpSpPr>
+      <p:grpSpPr>
+        <a:xfrm>
+          <a:off x="0" y="0"/>
+          <a:ext cx="0" cy="0"/>
+          <a:chOff x="0" y="0"/>
+          <a:chExt cx="0" cy="0"/>
+        </a:xfrm>
+      </p:grpSpPr>
+      <p:sp>
+        <p:nvSpPr>
+          <p:cNvPr id="2" name="Title 1">
+            <a:extLst>
+              <a:ext uri="{FF2B5EF4-FFF2-40B4-BE49-F238E27FC236}">
+                <a16:creationId xmlns:a16="http://schemas.microsoft.com/office/drawing/2014/main" id="{E50D8083-58EF-5644-80F6-944B8EF28126}"/>
+              </a:ext>
+            </a:extLst>
+          </p:cNvPr>
+          <p:cNvSpPr>
+            <a:spLocks noGrp="1"/>
+          </p:cNvSpPr>
+          <p:nvPr>
+            <p:ph type="title"/>
+          </p:nvPr>
+        </p:nvSpPr>
+        <p:spPr>
+          <a:xfrm>
+            <a:off x="838200" y="293873"/>
+            <a:ext cx="10515600" cy="1325563"/>
+          </a:xfrm>
+        </p:spPr>
+        <p:txBody>
+          <a:bodyPr/>
+          <a:lstStyle/>
+          <a:p>
+            <a:r>
+              <a:rPr lang="en-US" dirty="0"/>
+              <a:t>Linear Regression Scenarios(Tset2power)</a:t>
+            </a:r>
+          </a:p>
+        </p:txBody>
+      </p:sp>
+      <mc:AlternateContent xmlns:mc="http://schemas.openxmlformats.org/markup-compatibility/2006">
+        <mc:Choice xmlns:a14="http://schemas.microsoft.com/office/drawing/2010/main" Requires="a14">
+          <p:sp>
+            <p:nvSpPr>
+              <p:cNvPr id="3" name="Content Placeholder 2">
+                <a:extLst>
+                  <a:ext uri="{FF2B5EF4-FFF2-40B4-BE49-F238E27FC236}">
+                    <a16:creationId xmlns:a16="http://schemas.microsoft.com/office/drawing/2014/main" id="{ECB9528C-D5BB-914D-9A7C-C52C1CB55AF3}"/>
+                  </a:ext>
+                </a:extLst>
+              </p:cNvPr>
+              <p:cNvSpPr>
+                <a:spLocks noGrp="1"/>
+              </p:cNvSpPr>
+              <p:nvPr>
+                <p:ph idx="1"/>
+              </p:nvPr>
+            </p:nvSpPr>
+            <p:spPr>
+              <a:xfrm>
+                <a:off x="838200" y="1365662"/>
+                <a:ext cx="10515600" cy="4811301"/>
+              </a:xfrm>
+            </p:spPr>
+            <p:txBody>
+              <a:bodyPr>
+                <a:normAutofit fontScale="92500" lnSpcReduction="10000"/>
+              </a:bodyPr>
+              <a:lstStyle/>
+              <a:p>
+                <a:r>
+                  <a:rPr lang="en-US" dirty="0">
+                    <a:latin typeface="Cambria Math" panose="02040503050406030204" pitchFamily="18" charset="0"/>
+                  </a:rPr>
+                  <a:t>VB air mass flow dynamics</a:t>
+                </a:r>
+              </a:p>
+              <a:p>
+                <a:pPr lvl="1"/>
+                <a14:m>
+                  <m:oMath xmlns:m="http://schemas.openxmlformats.org/officeDocument/2006/math">
+                    <m:sSub>
+                      <m:sSubPr>
+                        <m:ctrlPr>
+                          <a:rPr lang="en-US" i="1" dirty="0">
+                            <a:latin typeface="Cambria Math" panose="02040503050406030204" pitchFamily="18" charset="0"/>
+                          </a:rPr>
+                        </m:ctrlPr>
+                      </m:sSubPr>
+                      <m:e>
+                        <m:acc>
+                          <m:accPr>
+                            <m:chr m:val="̇"/>
+                            <m:ctrlPr>
+                              <a:rPr lang="en-US" i="1">
+                                <a:latin typeface="Cambria Math" panose="02040503050406030204" pitchFamily="18" charset="0"/>
+                              </a:rPr>
+                            </m:ctrlPr>
+                          </m:accPr>
+                          <m:e>
+                            <m:r>
+                              <a:rPr lang="en-US" i="1">
+                                <a:latin typeface="Cambria Math" panose="02040503050406030204" pitchFamily="18" charset="0"/>
+                              </a:rPr>
+                              <m:t>𝑚</m:t>
+                            </m:r>
+                          </m:e>
+                        </m:acc>
+                      </m:e>
+                      <m:sub>
+                        <m:r>
+                          <a:rPr lang="en-US" b="0" i="1" smtClean="0">
+                            <a:latin typeface="Cambria Math" panose="02040503050406030204" pitchFamily="18" charset="0"/>
+                          </a:rPr>
+                          <m:t>𝑧</m:t>
+                        </m:r>
+                        <m:r>
+                          <a:rPr lang="en-US" b="0" i="1" smtClean="0">
+                            <a:latin typeface="Cambria Math" panose="02040503050406030204" pitchFamily="18" charset="0"/>
+                          </a:rPr>
+                          <m:t>,</m:t>
+                        </m:r>
+                        <m:r>
+                          <a:rPr lang="en-US" i="1" dirty="0">
+                            <a:latin typeface="Cambria Math" panose="02040503050406030204" pitchFamily="18" charset="0"/>
+                          </a:rPr>
+                          <m:t>𝑡</m:t>
+                        </m:r>
+                      </m:sub>
+                    </m:sSub>
+                    <m:r>
+                      <a:rPr lang="en-US" i="1" dirty="0">
+                        <a:latin typeface="Cambria Math" panose="02040503050406030204" pitchFamily="18" charset="0"/>
+                      </a:rPr>
+                      <m:t>=</m:t>
+                    </m:r>
+                    <m:sSub>
+                      <m:sSubPr>
+                        <m:ctrlPr>
+                          <a:rPr lang="en-US" i="1" dirty="0">
+                            <a:latin typeface="Cambria Math" panose="02040503050406030204" pitchFamily="18" charset="0"/>
+                          </a:rPr>
+                        </m:ctrlPr>
+                      </m:sSubPr>
+                      <m:e>
+                        <m:r>
+                          <a:rPr lang="en-US" i="1" dirty="0">
+                            <a:latin typeface="Cambria Math" panose="02040503050406030204" pitchFamily="18" charset="0"/>
+                          </a:rPr>
+                          <m:t>𝑎</m:t>
+                        </m:r>
+                      </m:e>
+                      <m:sub>
+                        <m:r>
+                          <a:rPr lang="en-US" i="1" dirty="0">
+                            <a:latin typeface="Cambria Math" panose="02040503050406030204" pitchFamily="18" charset="0"/>
+                          </a:rPr>
+                          <m:t>1</m:t>
+                        </m:r>
+                      </m:sub>
+                    </m:sSub>
+                    <m:r>
+                      <a:rPr lang="en-US" i="1" dirty="0">
+                        <a:latin typeface="Cambria Math" panose="02040503050406030204" pitchFamily="18" charset="0"/>
+                      </a:rPr>
+                      <m:t>∗</m:t>
+                    </m:r>
+                    <m:sSubSup>
+                      <m:sSubSupPr>
+                        <m:ctrlPr>
+                          <a:rPr lang="en-US" i="1" dirty="0">
+                            <a:latin typeface="Cambria Math" panose="02040503050406030204" pitchFamily="18" charset="0"/>
+                          </a:rPr>
+                        </m:ctrlPr>
+                      </m:sSubSupPr>
+                      <m:e>
+                        <m:r>
+                          <a:rPr lang="en-US" i="1" dirty="0">
+                            <a:latin typeface="Cambria Math" panose="02040503050406030204" pitchFamily="18" charset="0"/>
+                          </a:rPr>
+                          <m:t>𝑇</m:t>
+                        </m:r>
+                      </m:e>
+                      <m:sub>
+                        <m:r>
+                          <a:rPr lang="en-US" i="1" dirty="0">
+                            <a:latin typeface="Cambria Math" panose="02040503050406030204" pitchFamily="18" charset="0"/>
+                          </a:rPr>
+                          <m:t>𝑧</m:t>
+                        </m:r>
+                      </m:sub>
+                      <m:sup>
+                        <m:r>
+                          <a:rPr lang="en-US" b="0" i="1" dirty="0" smtClean="0">
+                            <a:latin typeface="Cambria Math" panose="02040503050406030204" pitchFamily="18" charset="0"/>
+                          </a:rPr>
+                          <m:t>𝑡</m:t>
+                        </m:r>
+                        <m:r>
+                          <a:rPr lang="en-US" b="0" i="1" dirty="0" smtClean="0">
+                            <a:latin typeface="Cambria Math" panose="02040503050406030204" pitchFamily="18" charset="0"/>
+                          </a:rPr>
+                          <m:t>−1</m:t>
+                        </m:r>
+                      </m:sup>
+                    </m:sSubSup>
+                    <m:r>
+                      <a:rPr lang="en-US" i="1" dirty="0">
+                        <a:latin typeface="Cambria Math" panose="02040503050406030204" pitchFamily="18" charset="0"/>
+                      </a:rPr>
+                      <m:t>+ </m:t>
+                    </m:r>
+                    <m:sSub>
+                      <m:sSubPr>
+                        <m:ctrlPr>
+                          <a:rPr lang="en-US" i="1" dirty="0">
+                            <a:latin typeface="Cambria Math" panose="02040503050406030204" pitchFamily="18" charset="0"/>
+                          </a:rPr>
+                        </m:ctrlPr>
+                      </m:sSubPr>
+                      <m:e>
+                        <m:r>
+                          <a:rPr lang="en-US" i="1" dirty="0">
+                            <a:latin typeface="Cambria Math" panose="02040503050406030204" pitchFamily="18" charset="0"/>
+                          </a:rPr>
+                          <m:t>𝑎</m:t>
+                        </m:r>
+                      </m:e>
+                      <m:sub>
+                        <m:r>
+                          <a:rPr lang="en-US" i="1" dirty="0">
+                            <a:latin typeface="Cambria Math" panose="02040503050406030204" pitchFamily="18" charset="0"/>
+                          </a:rPr>
+                          <m:t>2</m:t>
+                        </m:r>
+                      </m:sub>
+                    </m:sSub>
+                    <m:r>
+                      <a:rPr lang="en-US" i="1" dirty="0">
+                        <a:latin typeface="Cambria Math" panose="02040503050406030204" pitchFamily="18" charset="0"/>
+                      </a:rPr>
+                      <m:t>∗</m:t>
+                    </m:r>
+                    <m:sSubSup>
+                      <m:sSubSupPr>
+                        <m:ctrlPr>
+                          <a:rPr lang="en-US" i="1" dirty="0">
+                            <a:latin typeface="Cambria Math" panose="02040503050406030204" pitchFamily="18" charset="0"/>
+                          </a:rPr>
+                        </m:ctrlPr>
+                      </m:sSubSupPr>
+                      <m:e>
+                        <m:r>
+                          <a:rPr lang="en-US" i="1" dirty="0">
+                            <a:latin typeface="Cambria Math" panose="02040503050406030204" pitchFamily="18" charset="0"/>
+                          </a:rPr>
+                          <m:t>𝑇</m:t>
+                        </m:r>
+                      </m:e>
+                      <m:sub>
+                        <m:r>
+                          <a:rPr lang="en-US" i="1" dirty="0">
+                            <a:latin typeface="Cambria Math" panose="02040503050406030204" pitchFamily="18" charset="0"/>
+                          </a:rPr>
+                          <m:t>𝑜𝑎</m:t>
+                        </m:r>
+                      </m:sub>
+                      <m:sup>
+                        <m:r>
+                          <a:rPr lang="en-US" i="1" dirty="0">
+                            <a:latin typeface="Cambria Math" panose="02040503050406030204" pitchFamily="18" charset="0"/>
+                          </a:rPr>
+                          <m:t>𝑡</m:t>
+                        </m:r>
+                      </m:sup>
+                    </m:sSubSup>
+                    <m:r>
+                      <a:rPr lang="en-US" i="1" dirty="0" smtClean="0">
+                        <a:latin typeface="Cambria Math" panose="02040503050406030204" pitchFamily="18" charset="0"/>
+                      </a:rPr>
+                      <m:t>+ </m:t>
+                    </m:r>
+                    <m:sSub>
+                      <m:sSubPr>
+                        <m:ctrlPr>
+                          <a:rPr lang="en-US" i="1" dirty="0" smtClean="0">
+                            <a:latin typeface="Cambria Math" panose="02040503050406030204" pitchFamily="18" charset="0"/>
+                          </a:rPr>
+                        </m:ctrlPr>
+                      </m:sSubPr>
+                      <m:e>
+                        <m:r>
+                          <a:rPr lang="en-US" i="1" dirty="0">
+                            <a:latin typeface="Cambria Math" panose="02040503050406030204" pitchFamily="18" charset="0"/>
+                          </a:rPr>
+                          <m:t>𝑎</m:t>
+                        </m:r>
+                      </m:e>
+                      <m:sub>
+                        <m:r>
+                          <a:rPr lang="en-US" i="1" dirty="0">
+                            <a:latin typeface="Cambria Math" panose="02040503050406030204" pitchFamily="18" charset="0"/>
+                          </a:rPr>
+                          <m:t>3</m:t>
+                        </m:r>
+                      </m:sub>
+                    </m:sSub>
+                    <m:r>
+                      <a:rPr lang="en-US" i="1" dirty="0">
+                        <a:latin typeface="Cambria Math" panose="02040503050406030204" pitchFamily="18" charset="0"/>
+                      </a:rPr>
+                      <m:t>∗</m:t>
+                    </m:r>
+                    <m:sSubSup>
+                      <m:sSubSupPr>
+                        <m:ctrlPr>
+                          <a:rPr lang="en-US" i="1" dirty="0" smtClean="0">
+                            <a:latin typeface="Cambria Math" panose="02040503050406030204" pitchFamily="18" charset="0"/>
+                          </a:rPr>
+                        </m:ctrlPr>
+                      </m:sSubSupPr>
+                      <m:e>
+                        <m:r>
+                          <a:rPr lang="en-US" i="1" dirty="0">
+                            <a:latin typeface="Cambria Math" panose="02040503050406030204" pitchFamily="18" charset="0"/>
+                          </a:rPr>
+                          <m:t>𝑇</m:t>
+                        </m:r>
+                      </m:e>
+                      <m:sub>
+                        <m:r>
+                          <a:rPr lang="en-US" i="1" dirty="0">
+                            <a:latin typeface="Cambria Math" panose="02040503050406030204" pitchFamily="18" charset="0"/>
+                          </a:rPr>
+                          <m:t>𝑠𝑒𝑡</m:t>
+                        </m:r>
+                      </m:sub>
+                      <m:sup>
+                        <m:r>
+                          <a:rPr lang="en-US" i="1" dirty="0">
+                            <a:latin typeface="Cambria Math" panose="02040503050406030204" pitchFamily="18" charset="0"/>
+                          </a:rPr>
+                          <m:t>𝑡</m:t>
+                        </m:r>
+                      </m:sup>
+                    </m:sSubSup>
+                    <m:r>
+                      <a:rPr lang="en-US" i="1" dirty="0">
+                        <a:latin typeface="Cambria Math" panose="02040503050406030204" pitchFamily="18" charset="0"/>
+                      </a:rPr>
+                      <m:t>+</m:t>
+                    </m:r>
+                    <m:sSub>
+                      <m:sSubPr>
+                        <m:ctrlPr>
+                          <a:rPr lang="en-US" i="1" dirty="0">
+                            <a:latin typeface="Cambria Math" panose="02040503050406030204" pitchFamily="18" charset="0"/>
+                          </a:rPr>
+                        </m:ctrlPr>
+                      </m:sSubPr>
+                      <m:e>
+                        <m:r>
+                          <a:rPr lang="en-US" i="1" dirty="0">
+                            <a:latin typeface="Cambria Math" panose="02040503050406030204" pitchFamily="18" charset="0"/>
+                          </a:rPr>
+                          <m:t>𝑎</m:t>
+                        </m:r>
+                      </m:e>
+                      <m:sub>
+                        <m:r>
+                          <a:rPr lang="en-US" i="1" dirty="0" smtClean="0">
+                            <a:latin typeface="Cambria Math" panose="02040503050406030204" pitchFamily="18" charset="0"/>
+                          </a:rPr>
+                          <m:t>4</m:t>
+                        </m:r>
+                      </m:sub>
+                    </m:sSub>
+                  </m:oMath>
+                </a14:m>
+                <a:endParaRPr lang="en-US" i="1" dirty="0"/>
+              </a:p>
+              <a:p>
+                <a:pPr lvl="1"/>
+                <a:r>
+                  <a:rPr lang="en-US" dirty="0"/>
+                  <a:t>Fan power model  and chiller power model training:</a:t>
+                </a:r>
+              </a:p>
+              <a:p>
+                <a:pPr lvl="2"/>
+                <a:r>
+                  <a:rPr lang="en-US" dirty="0"/>
+                  <a:t>Obtain </a:t>
+                </a:r>
+                <a14:m>
+                  <m:oMath xmlns:m="http://schemas.openxmlformats.org/officeDocument/2006/math">
+                    <m:sSub>
+                      <m:sSubPr>
+                        <m:ctrlPr>
+                          <a:rPr lang="en-US" b="0" i="1" smtClean="0">
+                            <a:latin typeface="Cambria Math" panose="02040503050406030204" pitchFamily="18" charset="0"/>
+                          </a:rPr>
+                        </m:ctrlPr>
+                      </m:sSubPr>
+                      <m:e>
+                        <m:r>
+                          <a:rPr lang="en-US" b="0" i="1" smtClean="0">
+                            <a:latin typeface="Cambria Math" panose="02040503050406030204" pitchFamily="18" charset="0"/>
+                          </a:rPr>
+                          <m:t>𝑐</m:t>
+                        </m:r>
+                      </m:e>
+                      <m:sub>
+                        <m:r>
+                          <a:rPr lang="en-US" b="0" i="1" smtClean="0">
+                            <a:latin typeface="Cambria Math" panose="02040503050406030204" pitchFamily="18" charset="0"/>
+                          </a:rPr>
+                          <m:t>0</m:t>
+                        </m:r>
+                      </m:sub>
+                    </m:sSub>
+                    <m:r>
+                      <a:rPr lang="en-US" b="0" i="1" smtClean="0">
+                        <a:latin typeface="Cambria Math" panose="02040503050406030204" pitchFamily="18" charset="0"/>
+                      </a:rPr>
+                      <m:t>~</m:t>
+                    </m:r>
+                    <m:sSub>
+                      <m:sSubPr>
+                        <m:ctrlPr>
+                          <a:rPr lang="en-US" b="0" i="1" smtClean="0">
+                            <a:latin typeface="Cambria Math" panose="02040503050406030204" pitchFamily="18" charset="0"/>
+                          </a:rPr>
+                        </m:ctrlPr>
+                      </m:sSubPr>
+                      <m:e>
+                        <m:r>
+                          <a:rPr lang="en-US" b="0" i="1" smtClean="0">
+                            <a:latin typeface="Cambria Math" panose="02040503050406030204" pitchFamily="18" charset="0"/>
+                          </a:rPr>
+                          <m:t>𝑐</m:t>
+                        </m:r>
+                      </m:e>
+                      <m:sub>
+                        <m:r>
+                          <a:rPr lang="en-US" b="0" i="1" smtClean="0">
+                            <a:latin typeface="Cambria Math" panose="02040503050406030204" pitchFamily="18" charset="0"/>
+                          </a:rPr>
+                          <m:t>3</m:t>
+                        </m:r>
+                      </m:sub>
+                    </m:sSub>
+                  </m:oMath>
+                </a14:m>
+                <a:r>
+                  <a:rPr lang="en-US" dirty="0"/>
+                  <a:t> and </a:t>
+                </a:r>
+                <a14:m>
+                  <m:oMath xmlns:m="http://schemas.openxmlformats.org/officeDocument/2006/math">
+                    <m:sSub>
+                      <m:sSubPr>
+                        <m:ctrlPr>
+                          <a:rPr lang="en-US" i="1" dirty="0">
+                            <a:latin typeface="Cambria Math" panose="02040503050406030204" pitchFamily="18" charset="0"/>
+                          </a:rPr>
+                        </m:ctrlPr>
+                      </m:sSubPr>
+                      <m:e>
+                        <m:r>
+                          <a:rPr lang="en-US" i="1" dirty="0">
+                            <a:latin typeface="Cambria Math" panose="02040503050406030204" pitchFamily="18" charset="0"/>
+                          </a:rPr>
+                          <m:t>𝜂</m:t>
+                        </m:r>
+                      </m:e>
+                      <m:sub>
+                        <m:r>
+                          <a:rPr lang="en-US" i="1" dirty="0">
+                            <a:latin typeface="Cambria Math" panose="02040503050406030204" pitchFamily="18" charset="0"/>
+                          </a:rPr>
+                          <m:t>𝐶𝑂𝑃</m:t>
+                        </m:r>
+                      </m:sub>
+                    </m:sSub>
+                  </m:oMath>
+                </a14:m>
+                <a:r>
+                  <a:rPr lang="en-US" dirty="0"/>
+                  <a:t> (</a:t>
+                </a:r>
+                <a14:m>
+                  <m:oMath xmlns:m="http://schemas.openxmlformats.org/officeDocument/2006/math">
+                    <m:sSub>
+                      <m:sSubPr>
+                        <m:ctrlPr>
+                          <a:rPr lang="en-US" i="1" dirty="0">
+                            <a:latin typeface="Cambria Math" panose="02040503050406030204" pitchFamily="18" charset="0"/>
+                          </a:rPr>
+                        </m:ctrlPr>
+                      </m:sSubPr>
+                      <m:e>
+                        <m:r>
+                          <a:rPr lang="en-US" i="1" dirty="0">
+                            <a:latin typeface="Cambria Math" panose="02040503050406030204" pitchFamily="18" charset="0"/>
+                          </a:rPr>
+                          <m:t>𝑐</m:t>
+                        </m:r>
+                      </m:e>
+                      <m:sub>
+                        <m:r>
+                          <a:rPr lang="en-US" i="1" dirty="0">
+                            <a:latin typeface="Cambria Math" panose="02040503050406030204" pitchFamily="18" charset="0"/>
+                          </a:rPr>
+                          <m:t>𝑝</m:t>
+                        </m:r>
+                      </m:sub>
+                    </m:sSub>
+                  </m:oMath>
+                </a14:m>
+                <a:r>
+                  <a:rPr lang="en-US" dirty="0"/>
+                  <a:t> is known, </a:t>
+                </a:r>
+                <a14:m>
+                  <m:oMath xmlns:m="http://schemas.openxmlformats.org/officeDocument/2006/math">
+                    <m:sSub>
+                      <m:sSubPr>
+                        <m:ctrlPr>
+                          <a:rPr lang="en-US" b="0" i="1" smtClean="0">
+                            <a:latin typeface="Cambria Math" panose="02040503050406030204" pitchFamily="18" charset="0"/>
+                          </a:rPr>
+                        </m:ctrlPr>
+                      </m:sSubPr>
+                      <m:e>
+                        <m:r>
+                          <a:rPr lang="en-US" b="0" i="1" smtClean="0">
+                            <a:latin typeface="Cambria Math" panose="02040503050406030204" pitchFamily="18" charset="0"/>
+                          </a:rPr>
+                          <m:t>𝑇</m:t>
+                        </m:r>
+                      </m:e>
+                      <m:sub>
+                        <m:r>
+                          <a:rPr lang="en-US" b="0" i="1" smtClean="0">
+                            <a:latin typeface="Cambria Math" panose="02040503050406030204" pitchFamily="18" charset="0"/>
+                          </a:rPr>
+                          <m:t>𝑑𝑖𝑠</m:t>
+                        </m:r>
+                      </m:sub>
+                    </m:sSub>
+                    <m:r>
+                      <a:rPr lang="en-US" b="0" i="1" smtClean="0">
+                        <a:latin typeface="Cambria Math" panose="02040503050406030204" pitchFamily="18" charset="0"/>
+                      </a:rPr>
+                      <m:t>=12.8 </m:t>
+                    </m:r>
+                    <m:r>
+                      <a:rPr lang="en-US" b="0" i="1" smtClean="0">
+                        <a:latin typeface="Cambria Math" panose="02040503050406030204" pitchFamily="18" charset="0"/>
+                        <a:ea typeface="Cambria Math" panose="02040503050406030204" pitchFamily="18" charset="0"/>
+                      </a:rPr>
+                      <m:t>℃</m:t>
+                    </m:r>
+                  </m:oMath>
+                </a14:m>
+                <a:r>
+                  <a:rPr lang="en-US" dirty="0"/>
+                  <a:t>), limits of </a:t>
+                </a:r>
+                <a:r>
+                  <a:rPr lang="en-US" dirty="0" err="1"/>
+                  <a:t>Tset</a:t>
+                </a:r>
+                <a:r>
+                  <a:rPr lang="en-US" dirty="0"/>
+                  <a:t>, </a:t>
+                </a:r>
+                <a14:m>
+                  <m:oMath xmlns:m="http://schemas.openxmlformats.org/officeDocument/2006/math">
+                    <m:r>
+                      <a:rPr lang="en-US" i="1">
+                        <a:latin typeface="Cambria Math" panose="02040503050406030204" pitchFamily="18" charset="0"/>
+                      </a:rPr>
+                      <m:t>𝛿</m:t>
+                    </m:r>
+                  </m:oMath>
+                </a14:m>
+                <a:r>
+                  <a:rPr lang="en-US" i="1" dirty="0"/>
+                  <a:t>, </a:t>
+                </a:r>
+                <a:r>
+                  <a:rPr lang="en-US" i="1" dirty="0" err="1"/>
+                  <a:t>Tdis</a:t>
+                </a:r>
+                <a:endParaRPr lang="en-US" i="1" dirty="0"/>
+              </a:p>
+              <a:p>
+                <a:r>
+                  <a:rPr lang="en-US" dirty="0"/>
+                  <a:t>Power constraints</a:t>
+                </a:r>
+              </a:p>
+              <a:p>
+                <a:pPr lvl="1"/>
+                <a:r>
+                  <a:rPr lang="en-US" dirty="0"/>
+                  <a:t>Calculate fan power and chiller power</a:t>
+                </a:r>
+                <a:r>
+                  <a:rPr lang="en-US" dirty="0">
+                    <a:sym typeface="Wingdings" pitchFamily="2" charset="2"/>
+                  </a:rPr>
+                  <a:t>: </a:t>
+                </a:r>
+                <a:endParaRPr lang="en-US" dirty="0"/>
+              </a:p>
+              <a:p>
+                <a:pPr lvl="2"/>
+                <a14:m>
+                  <m:oMath xmlns:m="http://schemas.openxmlformats.org/officeDocument/2006/math">
+                    <m:sSubSup>
+                      <m:sSubSupPr>
+                        <m:ctrlPr>
+                          <a:rPr lang="en-US" i="1" dirty="0">
+                            <a:latin typeface="Cambria Math" panose="02040503050406030204" pitchFamily="18" charset="0"/>
+                          </a:rPr>
+                        </m:ctrlPr>
+                      </m:sSubSupPr>
+                      <m:e>
+                        <m:r>
+                          <a:rPr lang="en-US" i="1" dirty="0">
+                            <a:latin typeface="Cambria Math" panose="02040503050406030204" pitchFamily="18" charset="0"/>
+                          </a:rPr>
+                          <m:t>𝑃</m:t>
+                        </m:r>
+                      </m:e>
+                      <m:sub>
+                        <m:r>
+                          <a:rPr lang="en-US" b="0" i="1" dirty="0" smtClean="0">
+                            <a:latin typeface="Cambria Math" panose="02040503050406030204" pitchFamily="18" charset="0"/>
+                          </a:rPr>
+                          <m:t>𝑓𝑎𝑛</m:t>
+                        </m:r>
+                      </m:sub>
+                      <m:sup>
+                        <m:r>
+                          <a:rPr lang="en-US" i="1" dirty="0">
+                            <a:latin typeface="Cambria Math" panose="02040503050406030204" pitchFamily="18" charset="0"/>
+                          </a:rPr>
+                          <m:t>𝑡</m:t>
+                        </m:r>
+                      </m:sup>
+                    </m:sSubSup>
+                    <m:r>
+                      <a:rPr lang="en-US" i="1" dirty="0">
+                        <a:latin typeface="Cambria Math" panose="02040503050406030204" pitchFamily="18" charset="0"/>
+                      </a:rPr>
+                      <m:t>=</m:t>
+                    </m:r>
+                    <m:sSub>
+                      <m:sSubPr>
+                        <m:ctrlPr>
+                          <a:rPr lang="en-US" i="1" dirty="0">
+                            <a:latin typeface="Cambria Math" panose="02040503050406030204" pitchFamily="18" charset="0"/>
+                          </a:rPr>
+                        </m:ctrlPr>
+                      </m:sSubPr>
+                      <m:e>
+                        <m:r>
+                          <a:rPr lang="en-US" i="1" dirty="0">
+                            <a:latin typeface="Cambria Math" panose="02040503050406030204" pitchFamily="18" charset="0"/>
+                          </a:rPr>
+                          <m:t>𝑐</m:t>
+                        </m:r>
+                      </m:e>
+                      <m:sub>
+                        <m:r>
+                          <a:rPr lang="en-US" i="1" dirty="0">
+                            <a:latin typeface="Cambria Math" panose="02040503050406030204" pitchFamily="18" charset="0"/>
+                          </a:rPr>
+                          <m:t>1</m:t>
+                        </m:r>
+                      </m:sub>
+                    </m:sSub>
+                    <m:r>
+                      <a:rPr lang="en-US" i="1" dirty="0">
+                        <a:latin typeface="Cambria Math" panose="02040503050406030204" pitchFamily="18" charset="0"/>
+                      </a:rPr>
+                      <m:t>∗</m:t>
+                    </m:r>
+                    <m:sSubSup>
+                      <m:sSubSupPr>
+                        <m:ctrlPr>
+                          <a:rPr lang="en-US" i="1" dirty="0">
+                            <a:latin typeface="Cambria Math" panose="02040503050406030204" pitchFamily="18" charset="0"/>
+                          </a:rPr>
+                        </m:ctrlPr>
+                      </m:sSubSupPr>
+                      <m:e>
+                        <m:acc>
+                          <m:accPr>
+                            <m:chr m:val="̇"/>
+                            <m:ctrlPr>
+                              <a:rPr lang="en-US" i="1" dirty="0">
+                                <a:latin typeface="Cambria Math" panose="02040503050406030204" pitchFamily="18" charset="0"/>
+                              </a:rPr>
+                            </m:ctrlPr>
+                          </m:accPr>
+                          <m:e>
+                            <m:r>
+                              <a:rPr lang="en-US" i="1" dirty="0">
+                                <a:latin typeface="Cambria Math" panose="02040503050406030204" pitchFamily="18" charset="0"/>
+                              </a:rPr>
+                              <m:t>𝑚</m:t>
+                            </m:r>
+                          </m:e>
+                        </m:acc>
+                      </m:e>
+                      <m:sub>
+                        <m:r>
+                          <a:rPr lang="en-US" i="1" dirty="0">
+                            <a:latin typeface="Cambria Math" panose="02040503050406030204" pitchFamily="18" charset="0"/>
+                          </a:rPr>
+                          <m:t>𝑡𝑜𝑡</m:t>
+                        </m:r>
+                      </m:sub>
+                      <m:sup>
+                        <m:r>
+                          <a:rPr lang="en-US" i="1" dirty="0">
+                            <a:latin typeface="Cambria Math" panose="02040503050406030204" pitchFamily="18" charset="0"/>
+                          </a:rPr>
+                          <m:t>𝑡</m:t>
+                        </m:r>
+                      </m:sup>
+                    </m:sSubSup>
+                    <m:r>
+                      <a:rPr lang="en-US" i="1" dirty="0">
+                        <a:latin typeface="Cambria Math" panose="02040503050406030204" pitchFamily="18" charset="0"/>
+                      </a:rPr>
+                      <m:t>+ </m:t>
+                    </m:r>
+                    <m:sSub>
+                      <m:sSubPr>
+                        <m:ctrlPr>
+                          <a:rPr lang="en-US" i="1" dirty="0">
+                            <a:latin typeface="Cambria Math" panose="02040503050406030204" pitchFamily="18" charset="0"/>
+                          </a:rPr>
+                        </m:ctrlPr>
+                      </m:sSubPr>
+                      <m:e>
+                        <m:r>
+                          <a:rPr lang="en-US" i="1" dirty="0">
+                            <a:latin typeface="Cambria Math" panose="02040503050406030204" pitchFamily="18" charset="0"/>
+                          </a:rPr>
+                          <m:t>𝑐</m:t>
+                        </m:r>
+                      </m:e>
+                      <m:sub>
+                        <m:r>
+                          <a:rPr lang="en-US" i="1" dirty="0">
+                            <a:latin typeface="Cambria Math" panose="02040503050406030204" pitchFamily="18" charset="0"/>
+                          </a:rPr>
+                          <m:t>2</m:t>
+                        </m:r>
+                      </m:sub>
+                    </m:sSub>
+                    <m:r>
+                      <a:rPr lang="en-US" i="1" dirty="0">
+                        <a:latin typeface="Cambria Math" panose="02040503050406030204" pitchFamily="18" charset="0"/>
+                      </a:rPr>
+                      <m:t>∗</m:t>
+                    </m:r>
+                    <m:sSup>
+                      <m:sSupPr>
+                        <m:ctrlPr>
+                          <a:rPr lang="en-US" i="1" dirty="0">
+                            <a:latin typeface="Cambria Math" panose="02040503050406030204" pitchFamily="18" charset="0"/>
+                          </a:rPr>
+                        </m:ctrlPr>
+                      </m:sSupPr>
+                      <m:e>
+                        <m:sSubSup>
+                          <m:sSubSupPr>
+                            <m:ctrlPr>
+                              <a:rPr lang="en-US" i="1" dirty="0">
+                                <a:latin typeface="Cambria Math" panose="02040503050406030204" pitchFamily="18" charset="0"/>
+                              </a:rPr>
+                            </m:ctrlPr>
+                          </m:sSubSupPr>
+                          <m:e>
+                            <m:r>
+                              <a:rPr lang="en-US" i="1" dirty="0">
+                                <a:latin typeface="Cambria Math" panose="02040503050406030204" pitchFamily="18" charset="0"/>
+                              </a:rPr>
+                              <m:t>(</m:t>
+                            </m:r>
+                            <m:acc>
+                              <m:accPr>
+                                <m:chr m:val="̇"/>
+                                <m:ctrlPr>
+                                  <a:rPr lang="en-US" i="1" dirty="0">
+                                    <a:latin typeface="Cambria Math" panose="02040503050406030204" pitchFamily="18" charset="0"/>
+                                  </a:rPr>
+                                </m:ctrlPr>
+                              </m:accPr>
+                              <m:e>
+                                <m:r>
+                                  <a:rPr lang="en-US" i="1" dirty="0">
+                                    <a:latin typeface="Cambria Math" panose="02040503050406030204" pitchFamily="18" charset="0"/>
+                                  </a:rPr>
+                                  <m:t>𝑚</m:t>
+                                </m:r>
+                              </m:e>
+                            </m:acc>
+                          </m:e>
+                          <m:sub>
+                            <m:r>
+                              <a:rPr lang="en-US" i="1" dirty="0">
+                                <a:latin typeface="Cambria Math" panose="02040503050406030204" pitchFamily="18" charset="0"/>
+                              </a:rPr>
+                              <m:t>𝑡𝑜𝑡</m:t>
+                            </m:r>
+                          </m:sub>
+                          <m:sup>
+                            <m:r>
+                              <a:rPr lang="en-US" i="1" dirty="0">
+                                <a:latin typeface="Cambria Math" panose="02040503050406030204" pitchFamily="18" charset="0"/>
+                              </a:rPr>
+                              <m:t>𝑡</m:t>
+                            </m:r>
+                          </m:sup>
+                        </m:sSubSup>
+                        <m:r>
+                          <a:rPr lang="en-US" i="1" dirty="0">
+                            <a:latin typeface="Cambria Math" panose="02040503050406030204" pitchFamily="18" charset="0"/>
+                          </a:rPr>
+                          <m:t>)</m:t>
+                        </m:r>
+                      </m:e>
+                      <m:sup>
+                        <m:r>
+                          <a:rPr lang="en-US" i="1" dirty="0">
+                            <a:latin typeface="Cambria Math" panose="02040503050406030204" pitchFamily="18" charset="0"/>
+                          </a:rPr>
+                          <m:t>2</m:t>
+                        </m:r>
+                      </m:sup>
+                    </m:sSup>
+                    <m:r>
+                      <a:rPr lang="en-US" i="1" dirty="0">
+                        <a:latin typeface="Cambria Math" panose="02040503050406030204" pitchFamily="18" charset="0"/>
+                      </a:rPr>
+                      <m:t>+</m:t>
+                    </m:r>
+                    <m:sSub>
+                      <m:sSubPr>
+                        <m:ctrlPr>
+                          <a:rPr lang="en-US" i="1" dirty="0">
+                            <a:latin typeface="Cambria Math" panose="02040503050406030204" pitchFamily="18" charset="0"/>
+                          </a:rPr>
+                        </m:ctrlPr>
+                      </m:sSubPr>
+                      <m:e>
+                        <m:r>
+                          <a:rPr lang="en-US" i="1" dirty="0">
+                            <a:latin typeface="Cambria Math" panose="02040503050406030204" pitchFamily="18" charset="0"/>
+                          </a:rPr>
+                          <m:t>𝑐</m:t>
+                        </m:r>
+                      </m:e>
+                      <m:sub>
+                        <m:r>
+                          <a:rPr lang="en-US" i="1" dirty="0">
+                            <a:latin typeface="Cambria Math" panose="02040503050406030204" pitchFamily="18" charset="0"/>
+                          </a:rPr>
+                          <m:t>3</m:t>
+                        </m:r>
+                      </m:sub>
+                    </m:sSub>
+                    <m:r>
+                      <a:rPr lang="en-US" i="1" dirty="0">
+                        <a:latin typeface="Cambria Math" panose="02040503050406030204" pitchFamily="18" charset="0"/>
+                      </a:rPr>
+                      <m:t>∗</m:t>
+                    </m:r>
+                    <m:sSup>
+                      <m:sSupPr>
+                        <m:ctrlPr>
+                          <a:rPr lang="en-US" i="1" dirty="0">
+                            <a:latin typeface="Cambria Math" panose="02040503050406030204" pitchFamily="18" charset="0"/>
+                          </a:rPr>
+                        </m:ctrlPr>
+                      </m:sSupPr>
+                      <m:e>
+                        <m:sSubSup>
+                          <m:sSubSupPr>
+                            <m:ctrlPr>
+                              <a:rPr lang="en-US" i="1" dirty="0">
+                                <a:latin typeface="Cambria Math" panose="02040503050406030204" pitchFamily="18" charset="0"/>
+                              </a:rPr>
+                            </m:ctrlPr>
+                          </m:sSubSupPr>
+                          <m:e>
+                            <m:r>
+                              <a:rPr lang="en-US" i="1" dirty="0">
+                                <a:latin typeface="Cambria Math" panose="02040503050406030204" pitchFamily="18" charset="0"/>
+                              </a:rPr>
+                              <m:t>(</m:t>
+                            </m:r>
+                            <m:acc>
+                              <m:accPr>
+                                <m:chr m:val="̇"/>
+                                <m:ctrlPr>
+                                  <a:rPr lang="en-US" i="1" dirty="0">
+                                    <a:latin typeface="Cambria Math" panose="02040503050406030204" pitchFamily="18" charset="0"/>
+                                  </a:rPr>
+                                </m:ctrlPr>
+                              </m:accPr>
+                              <m:e>
+                                <m:r>
+                                  <a:rPr lang="en-US" i="1" dirty="0">
+                                    <a:latin typeface="Cambria Math" panose="02040503050406030204" pitchFamily="18" charset="0"/>
+                                  </a:rPr>
+                                  <m:t>𝑚</m:t>
+                                </m:r>
+                              </m:e>
+                            </m:acc>
+                          </m:e>
+                          <m:sub>
+                            <m:r>
+                              <a:rPr lang="en-US" i="1" dirty="0">
+                                <a:latin typeface="Cambria Math" panose="02040503050406030204" pitchFamily="18" charset="0"/>
+                              </a:rPr>
+                              <m:t>𝑡𝑜𝑡</m:t>
+                            </m:r>
+                          </m:sub>
+                          <m:sup>
+                            <m:r>
+                              <a:rPr lang="en-US" i="1" dirty="0">
+                                <a:latin typeface="Cambria Math" panose="02040503050406030204" pitchFamily="18" charset="0"/>
+                              </a:rPr>
+                              <m:t>𝑡</m:t>
+                            </m:r>
+                          </m:sup>
+                        </m:sSubSup>
+                        <m:r>
+                          <a:rPr lang="en-US" i="1" dirty="0">
+                            <a:latin typeface="Cambria Math" panose="02040503050406030204" pitchFamily="18" charset="0"/>
+                          </a:rPr>
+                          <m:t>)</m:t>
+                        </m:r>
+                      </m:e>
+                      <m:sup>
+                        <m:r>
+                          <a:rPr lang="en-US" i="1" dirty="0">
+                            <a:latin typeface="Cambria Math" panose="02040503050406030204" pitchFamily="18" charset="0"/>
+                          </a:rPr>
+                          <m:t>3</m:t>
+                        </m:r>
+                      </m:sup>
+                    </m:sSup>
+                    <m:r>
+                      <a:rPr lang="en-US" i="1" dirty="0">
+                        <a:latin typeface="Cambria Math" panose="02040503050406030204" pitchFamily="18" charset="0"/>
+                      </a:rPr>
+                      <m:t>+</m:t>
+                    </m:r>
+                    <m:sSub>
+                      <m:sSubPr>
+                        <m:ctrlPr>
+                          <a:rPr lang="en-US" i="1" dirty="0">
+                            <a:latin typeface="Cambria Math" panose="02040503050406030204" pitchFamily="18" charset="0"/>
+                          </a:rPr>
+                        </m:ctrlPr>
+                      </m:sSubPr>
+                      <m:e>
+                        <m:r>
+                          <a:rPr lang="en-US" i="1" dirty="0">
+                            <a:latin typeface="Cambria Math" panose="02040503050406030204" pitchFamily="18" charset="0"/>
+                          </a:rPr>
+                          <m:t>𝑐</m:t>
+                        </m:r>
+                      </m:e>
+                      <m:sub>
+                        <m:r>
+                          <a:rPr lang="en-US" i="1" dirty="0">
+                            <a:latin typeface="Cambria Math" panose="02040503050406030204" pitchFamily="18" charset="0"/>
+                          </a:rPr>
+                          <m:t>0</m:t>
+                        </m:r>
+                      </m:sub>
+                    </m:sSub>
+                  </m:oMath>
+                </a14:m>
+                <a:endParaRPr lang="en-US" dirty="0"/>
+              </a:p>
+              <a:p>
+                <a:pPr lvl="2"/>
+                <a14:m>
+                  <m:oMath xmlns:m="http://schemas.openxmlformats.org/officeDocument/2006/math">
+                    <m:sSubSup>
+                      <m:sSubSupPr>
+                        <m:ctrlPr>
+                          <a:rPr lang="en-US" i="1" dirty="0">
+                            <a:latin typeface="Cambria Math" panose="02040503050406030204" pitchFamily="18" charset="0"/>
+                          </a:rPr>
+                        </m:ctrlPr>
+                      </m:sSubSupPr>
+                      <m:e>
+                        <m:r>
+                          <a:rPr lang="en-US" i="1" dirty="0">
+                            <a:latin typeface="Cambria Math" panose="02040503050406030204" pitchFamily="18" charset="0"/>
+                          </a:rPr>
+                          <m:t>𝑃</m:t>
+                        </m:r>
+                      </m:e>
+                      <m:sub>
+                        <m:r>
+                          <a:rPr lang="en-US" b="0" i="1" dirty="0" smtClean="0">
+                            <a:latin typeface="Cambria Math" panose="02040503050406030204" pitchFamily="18" charset="0"/>
+                          </a:rPr>
+                          <m:t>𝑐h𝑖𝑙𝑙𝑒𝑟</m:t>
+                        </m:r>
+                      </m:sub>
+                      <m:sup>
+                        <m:r>
+                          <a:rPr lang="en-US" i="1" dirty="0">
+                            <a:latin typeface="Cambria Math" panose="02040503050406030204" pitchFamily="18" charset="0"/>
+                          </a:rPr>
+                          <m:t>𝑡</m:t>
+                        </m:r>
+                      </m:sup>
+                    </m:sSubSup>
+                    <m:r>
+                      <a:rPr lang="en-US" i="1" dirty="0">
+                        <a:latin typeface="Cambria Math" panose="02040503050406030204" pitchFamily="18" charset="0"/>
+                      </a:rPr>
+                      <m:t>= </m:t>
+                    </m:r>
+                    <m:f>
+                      <m:fPr>
+                        <m:ctrlPr>
+                          <a:rPr lang="en-US" i="1" dirty="0">
+                            <a:latin typeface="Cambria Math" panose="02040503050406030204" pitchFamily="18" charset="0"/>
+                          </a:rPr>
+                        </m:ctrlPr>
+                      </m:fPr>
+                      <m:num>
+                        <m:sSub>
+                          <m:sSubPr>
+                            <m:ctrlPr>
+                              <a:rPr lang="en-US" i="1" dirty="0">
+                                <a:latin typeface="Cambria Math" panose="02040503050406030204" pitchFamily="18" charset="0"/>
+                              </a:rPr>
+                            </m:ctrlPr>
+                          </m:sSubPr>
+                          <m:e>
+                            <m:r>
+                              <a:rPr lang="en-US" i="1" dirty="0">
+                                <a:latin typeface="Cambria Math" panose="02040503050406030204" pitchFamily="18" charset="0"/>
+                              </a:rPr>
+                              <m:t>𝑐</m:t>
+                            </m:r>
+                          </m:e>
+                          <m:sub>
+                            <m:r>
+                              <a:rPr lang="en-US" i="1" dirty="0">
+                                <a:latin typeface="Cambria Math" panose="02040503050406030204" pitchFamily="18" charset="0"/>
+                              </a:rPr>
+                              <m:t>𝑝</m:t>
+                            </m:r>
+                          </m:sub>
+                        </m:sSub>
+                        <m:sSubSup>
+                          <m:sSubSupPr>
+                            <m:ctrlPr>
+                              <a:rPr lang="en-US" i="1" dirty="0">
+                                <a:latin typeface="Cambria Math" panose="02040503050406030204" pitchFamily="18" charset="0"/>
+                              </a:rPr>
+                            </m:ctrlPr>
+                          </m:sSubSupPr>
+                          <m:e>
+                            <m:acc>
+                              <m:accPr>
+                                <m:chr m:val="̇"/>
+                                <m:ctrlPr>
+                                  <a:rPr lang="en-US" i="1" dirty="0">
+                                    <a:latin typeface="Cambria Math" panose="02040503050406030204" pitchFamily="18" charset="0"/>
+                                  </a:rPr>
+                                </m:ctrlPr>
+                              </m:accPr>
+                              <m:e>
+                                <m:r>
+                                  <a:rPr lang="en-US" i="1" dirty="0">
+                                    <a:latin typeface="Cambria Math" panose="02040503050406030204" pitchFamily="18" charset="0"/>
+                                  </a:rPr>
+                                  <m:t>𝑚</m:t>
+                                </m:r>
+                              </m:e>
+                            </m:acc>
+                          </m:e>
+                          <m:sub>
+                            <m:r>
+                              <a:rPr lang="en-US" i="1" dirty="0">
+                                <a:latin typeface="Cambria Math" panose="02040503050406030204" pitchFamily="18" charset="0"/>
+                              </a:rPr>
+                              <m:t>𝑡𝑜𝑡</m:t>
+                            </m:r>
+                          </m:sub>
+                          <m:sup>
+                            <m:r>
+                              <a:rPr lang="en-US" i="1" dirty="0">
+                                <a:latin typeface="Cambria Math" panose="02040503050406030204" pitchFamily="18" charset="0"/>
+                              </a:rPr>
+                              <m:t>𝑡</m:t>
+                            </m:r>
+                          </m:sup>
+                        </m:sSubSup>
+                      </m:num>
+                      <m:den>
+                        <m:sSub>
+                          <m:sSubPr>
+                            <m:ctrlPr>
+                              <a:rPr lang="en-US" i="1" dirty="0">
+                                <a:latin typeface="Cambria Math" panose="02040503050406030204" pitchFamily="18" charset="0"/>
+                              </a:rPr>
+                            </m:ctrlPr>
+                          </m:sSubPr>
+                          <m:e>
+                            <m:r>
+                              <a:rPr lang="en-US" i="1" dirty="0">
+                                <a:latin typeface="Cambria Math" panose="02040503050406030204" pitchFamily="18" charset="0"/>
+                              </a:rPr>
+                              <m:t>𝜂</m:t>
+                            </m:r>
+                          </m:e>
+                          <m:sub>
+                            <m:r>
+                              <a:rPr lang="en-US" i="1" dirty="0">
+                                <a:latin typeface="Cambria Math" panose="02040503050406030204" pitchFamily="18" charset="0"/>
+                              </a:rPr>
+                              <m:t>𝐶𝑂𝑃</m:t>
+                            </m:r>
+                          </m:sub>
+                        </m:sSub>
+                      </m:den>
+                    </m:f>
+                    <m:r>
+                      <a:rPr lang="en-US" i="1" dirty="0">
+                        <a:latin typeface="Cambria Math" panose="02040503050406030204" pitchFamily="18" charset="0"/>
+                      </a:rPr>
+                      <m:t>[</m:t>
+                    </m:r>
+                    <m:sSubSup>
+                      <m:sSubSupPr>
+                        <m:ctrlPr>
+                          <a:rPr lang="en-US" i="1" dirty="0">
+                            <a:latin typeface="Cambria Math" panose="02040503050406030204" pitchFamily="18" charset="0"/>
+                          </a:rPr>
+                        </m:ctrlPr>
+                      </m:sSubSupPr>
+                      <m:e>
+                        <m:r>
+                          <a:rPr lang="en-US" i="1" dirty="0">
+                            <a:latin typeface="Cambria Math" panose="02040503050406030204" pitchFamily="18" charset="0"/>
+                          </a:rPr>
+                          <m:t>𝑇</m:t>
+                        </m:r>
+                      </m:e>
+                      <m:sub>
+                        <m:r>
+                          <a:rPr lang="en-US" b="0" i="1" dirty="0" smtClean="0">
+                            <a:latin typeface="Cambria Math" panose="02040503050406030204" pitchFamily="18" charset="0"/>
+                          </a:rPr>
+                          <m:t>𝑚𝑖𝑥</m:t>
+                        </m:r>
+                      </m:sub>
+                      <m:sup>
+                        <m:r>
+                          <a:rPr lang="en-US" i="1" dirty="0">
+                            <a:latin typeface="Cambria Math" panose="02040503050406030204" pitchFamily="18" charset="0"/>
+                          </a:rPr>
+                          <m:t>𝑡</m:t>
+                        </m:r>
+                      </m:sup>
+                    </m:sSubSup>
+                    <m:r>
+                      <a:rPr lang="en-US" i="1" dirty="0">
+                        <a:latin typeface="Cambria Math" panose="02040503050406030204" pitchFamily="18" charset="0"/>
+                      </a:rPr>
+                      <m:t>−</m:t>
+                    </m:r>
+                    <m:sSub>
+                      <m:sSubPr>
+                        <m:ctrlPr>
+                          <a:rPr lang="en-US" i="1" dirty="0">
+                            <a:latin typeface="Cambria Math" panose="02040503050406030204" pitchFamily="18" charset="0"/>
+                          </a:rPr>
+                        </m:ctrlPr>
+                      </m:sSubPr>
+                      <m:e>
+                        <m:r>
+                          <a:rPr lang="en-US" i="1" dirty="0">
+                            <a:latin typeface="Cambria Math" panose="02040503050406030204" pitchFamily="18" charset="0"/>
+                          </a:rPr>
+                          <m:t>𝑇</m:t>
+                        </m:r>
+                      </m:e>
+                      <m:sub>
+                        <m:r>
+                          <a:rPr lang="en-US" i="1" dirty="0">
+                            <a:latin typeface="Cambria Math" panose="02040503050406030204" pitchFamily="18" charset="0"/>
+                          </a:rPr>
+                          <m:t>𝑑𝑖𝑠</m:t>
+                        </m:r>
+                      </m:sub>
+                    </m:sSub>
+                    <m:r>
+                      <a:rPr lang="en-US" i="1" dirty="0">
+                        <a:latin typeface="Cambria Math" panose="02040503050406030204" pitchFamily="18" charset="0"/>
+                      </a:rPr>
+                      <m:t>]</m:t>
+                    </m:r>
+                  </m:oMath>
+                </a14:m>
+                <a:endParaRPr lang="en-US" dirty="0"/>
+              </a:p>
+              <a:p>
+                <a:pPr lvl="2"/>
+                <a:r>
+                  <a:rPr lang="en-US" dirty="0"/>
+                  <a:t>where </a:t>
+                </a:r>
+                <a14:m>
+                  <m:oMath xmlns:m="http://schemas.openxmlformats.org/officeDocument/2006/math">
+                    <m:sSubSup>
+                      <m:sSubSupPr>
+                        <m:ctrlPr>
+                          <a:rPr lang="en-US" i="1">
+                            <a:latin typeface="Cambria Math" panose="02040503050406030204" pitchFamily="18" charset="0"/>
+                          </a:rPr>
+                        </m:ctrlPr>
+                      </m:sSubSupPr>
+                      <m:e>
+                        <m:r>
+                          <a:rPr lang="en-US" i="1">
+                            <a:latin typeface="Cambria Math" panose="02040503050406030204" pitchFamily="18" charset="0"/>
+                          </a:rPr>
+                          <m:t>𝑇</m:t>
+                        </m:r>
+                      </m:e>
+                      <m:sub>
+                        <m:r>
+                          <a:rPr lang="en-US" b="0" i="1" smtClean="0">
+                            <a:latin typeface="Cambria Math" panose="02040503050406030204" pitchFamily="18" charset="0"/>
+                          </a:rPr>
+                          <m:t>𝑚𝑖𝑥</m:t>
+                        </m:r>
+                      </m:sub>
+                      <m:sup>
+                        <m:r>
+                          <a:rPr lang="en-US" i="1">
+                            <a:latin typeface="Cambria Math" panose="02040503050406030204" pitchFamily="18" charset="0"/>
+                          </a:rPr>
+                          <m:t>𝑡</m:t>
+                        </m:r>
+                      </m:sup>
+                    </m:sSubSup>
+                    <m:r>
+                      <a:rPr lang="en-US" i="1">
+                        <a:latin typeface="Cambria Math" panose="02040503050406030204" pitchFamily="18" charset="0"/>
+                      </a:rPr>
+                      <m:t>=</m:t>
+                    </m:r>
+                    <m:r>
+                      <a:rPr lang="en-US" i="1">
+                        <a:latin typeface="Cambria Math" panose="02040503050406030204" pitchFamily="18" charset="0"/>
+                      </a:rPr>
+                      <m:t>𝛿</m:t>
+                    </m:r>
+                    <m:f>
+                      <m:fPr>
+                        <m:ctrlPr>
+                          <a:rPr lang="en-US" i="1">
+                            <a:latin typeface="Cambria Math" panose="02040503050406030204" pitchFamily="18" charset="0"/>
+                          </a:rPr>
+                        </m:ctrlPr>
+                      </m:fPr>
+                      <m:num>
+                        <m:nary>
+                          <m:naryPr>
+                            <m:chr m:val="∑"/>
+                            <m:supHide m:val="on"/>
+                            <m:ctrlPr>
+                              <a:rPr lang="en-US" i="1">
+                                <a:latin typeface="Cambria Math" panose="02040503050406030204" pitchFamily="18" charset="0"/>
+                              </a:rPr>
+                            </m:ctrlPr>
+                          </m:naryPr>
+                          <m:sub>
+                            <m:r>
+                              <m:rPr>
+                                <m:brk m:alnAt="7"/>
+                              </m:rPr>
+                              <a:rPr lang="en-US" i="1">
+                                <a:latin typeface="Cambria Math" panose="02040503050406030204" pitchFamily="18" charset="0"/>
+                              </a:rPr>
+                              <m:t>𝑧</m:t>
+                            </m:r>
+                          </m:sub>
+                          <m:sup/>
+                          <m:e>
+                            <m:sSub>
+                              <m:sSubPr>
+                                <m:ctrlPr>
+                                  <a:rPr lang="en-US" i="1">
+                                    <a:latin typeface="Cambria Math" panose="02040503050406030204" pitchFamily="18" charset="0"/>
+                                  </a:rPr>
+                                </m:ctrlPr>
+                              </m:sSubPr>
+                              <m:e>
+                                <m:acc>
+                                  <m:accPr>
+                                    <m:chr m:val="̇"/>
+                                    <m:ctrlPr>
+                                      <a:rPr lang="en-US" i="1">
+                                        <a:latin typeface="Cambria Math" panose="02040503050406030204" pitchFamily="18" charset="0"/>
+                                      </a:rPr>
+                                    </m:ctrlPr>
+                                  </m:accPr>
+                                  <m:e>
+                                    <m:r>
+                                      <a:rPr lang="en-US" i="1">
+                                        <a:latin typeface="Cambria Math" panose="02040503050406030204" pitchFamily="18" charset="0"/>
+                                      </a:rPr>
+                                      <m:t>𝑚</m:t>
+                                    </m:r>
+                                  </m:e>
+                                </m:acc>
+                              </m:e>
+                              <m:sub>
+                                <m:r>
+                                  <a:rPr lang="en-US" i="1">
+                                    <a:latin typeface="Cambria Math" panose="02040503050406030204" pitchFamily="18" charset="0"/>
+                                  </a:rPr>
+                                  <m:t>𝑧</m:t>
+                                </m:r>
+                                <m:r>
+                                  <a:rPr lang="en-US" i="1">
+                                    <a:latin typeface="Cambria Math" panose="02040503050406030204" pitchFamily="18" charset="0"/>
+                                  </a:rPr>
+                                  <m:t>,</m:t>
+                                </m:r>
+                                <m:r>
+                                  <a:rPr lang="en-US" i="1">
+                                    <a:latin typeface="Cambria Math" panose="02040503050406030204" pitchFamily="18" charset="0"/>
+                                  </a:rPr>
+                                  <m:t>𝑡</m:t>
+                                </m:r>
+                              </m:sub>
+                            </m:sSub>
+                            <m:sSubSup>
+                              <m:sSubSupPr>
+                                <m:ctrlPr>
+                                  <a:rPr lang="en-US" i="1">
+                                    <a:latin typeface="Cambria Math" panose="02040503050406030204" pitchFamily="18" charset="0"/>
+                                  </a:rPr>
+                                </m:ctrlPr>
+                              </m:sSubSupPr>
+                              <m:e>
+                                <m:r>
+                                  <a:rPr lang="en-US" i="1">
+                                    <a:latin typeface="Cambria Math" panose="02040503050406030204" pitchFamily="18" charset="0"/>
+                                  </a:rPr>
+                                  <m:t>𝑇</m:t>
+                                </m:r>
+                              </m:e>
+                              <m:sub>
+                                <m:r>
+                                  <a:rPr lang="en-US" i="1">
+                                    <a:latin typeface="Cambria Math" panose="02040503050406030204" pitchFamily="18" charset="0"/>
+                                  </a:rPr>
+                                  <m:t>𝑧</m:t>
+                                </m:r>
+                              </m:sub>
+                              <m:sup>
+                                <m:r>
+                                  <a:rPr lang="en-US" i="1">
+                                    <a:latin typeface="Cambria Math" panose="02040503050406030204" pitchFamily="18" charset="0"/>
+                                  </a:rPr>
+                                  <m:t>𝑡</m:t>
+                                </m:r>
+                              </m:sup>
+                            </m:sSubSup>
+                          </m:e>
+                        </m:nary>
+                      </m:num>
+                      <m:den>
+                        <m:sSubSup>
+                          <m:sSubSupPr>
+                            <m:ctrlPr>
+                              <a:rPr lang="en-US" i="1" dirty="0">
+                                <a:latin typeface="Cambria Math" panose="02040503050406030204" pitchFamily="18" charset="0"/>
+                              </a:rPr>
+                            </m:ctrlPr>
+                          </m:sSubSupPr>
+                          <m:e>
+                            <m:acc>
+                              <m:accPr>
+                                <m:chr m:val="̇"/>
+                                <m:ctrlPr>
+                                  <a:rPr lang="en-US" i="1">
+                                    <a:latin typeface="Cambria Math" panose="02040503050406030204" pitchFamily="18" charset="0"/>
+                                  </a:rPr>
+                                </m:ctrlPr>
+                              </m:accPr>
+                              <m:e>
+                                <m:r>
+                                  <a:rPr lang="en-US" i="1">
+                                    <a:latin typeface="Cambria Math" panose="02040503050406030204" pitchFamily="18" charset="0"/>
+                                  </a:rPr>
+                                  <m:t>𝑚</m:t>
+                                </m:r>
+                              </m:e>
+                            </m:acc>
+                          </m:e>
+                          <m:sub>
+                            <m:r>
+                              <a:rPr lang="en-US" i="1" dirty="0">
+                                <a:latin typeface="Cambria Math" panose="02040503050406030204" pitchFamily="18" charset="0"/>
+                              </a:rPr>
+                              <m:t>𝑡𝑜𝑡</m:t>
+                            </m:r>
+                          </m:sub>
+                          <m:sup>
+                            <m:r>
+                              <a:rPr lang="en-US" i="1" dirty="0">
+                                <a:latin typeface="Cambria Math" panose="02040503050406030204" pitchFamily="18" charset="0"/>
+                              </a:rPr>
+                              <m:t>𝑡</m:t>
+                            </m:r>
+                          </m:sup>
+                        </m:sSubSup>
+                      </m:den>
+                    </m:f>
+                    <m:r>
+                      <a:rPr lang="en-US" i="1">
+                        <a:latin typeface="Cambria Math" panose="02040503050406030204" pitchFamily="18" charset="0"/>
+                      </a:rPr>
+                      <m:t>+</m:t>
+                    </m:r>
+                    <m:sSubSup>
+                      <m:sSubSupPr>
+                        <m:ctrlPr>
+                          <a:rPr lang="en-US" i="1">
+                            <a:latin typeface="Cambria Math" panose="02040503050406030204" pitchFamily="18" charset="0"/>
+                          </a:rPr>
+                        </m:ctrlPr>
+                      </m:sSubSupPr>
+                      <m:e>
+                        <m:d>
+                          <m:dPr>
+                            <m:ctrlPr>
+                              <a:rPr lang="en-US" i="1" smtClean="0">
+                                <a:latin typeface="Cambria Math" panose="02040503050406030204" pitchFamily="18" charset="0"/>
+                              </a:rPr>
+                            </m:ctrlPr>
+                          </m:dPr>
+                          <m:e>
+                            <m:r>
+                              <a:rPr lang="en-US" i="1">
+                                <a:latin typeface="Cambria Math" panose="02040503050406030204" pitchFamily="18" charset="0"/>
+                              </a:rPr>
+                              <m:t>1−</m:t>
+                            </m:r>
+                            <m:r>
+                              <a:rPr lang="en-US" i="1">
+                                <a:latin typeface="Cambria Math" panose="02040503050406030204" pitchFamily="18" charset="0"/>
+                              </a:rPr>
+                              <m:t>𝛿</m:t>
+                            </m:r>
+                          </m:e>
+                        </m:d>
+                        <m:r>
+                          <a:rPr lang="en-US" i="1">
+                            <a:latin typeface="Cambria Math" panose="02040503050406030204" pitchFamily="18" charset="0"/>
+                          </a:rPr>
+                          <m:t>𝑇</m:t>
+                        </m:r>
+                      </m:e>
+                      <m:sub>
+                        <m:r>
+                          <a:rPr lang="en-US" i="1">
+                            <a:latin typeface="Cambria Math" panose="02040503050406030204" pitchFamily="18" charset="0"/>
+                          </a:rPr>
+                          <m:t>𝑧</m:t>
+                        </m:r>
+                      </m:sub>
+                      <m:sup>
+                        <m:r>
+                          <a:rPr lang="en-US" i="1">
+                            <a:latin typeface="Cambria Math" panose="02040503050406030204" pitchFamily="18" charset="0"/>
+                          </a:rPr>
+                          <m:t>𝑡</m:t>
+                        </m:r>
+                      </m:sup>
+                    </m:sSubSup>
+                  </m:oMath>
+                </a14:m>
+                <a:r>
+                  <a:rPr lang="en-US" i="1" dirty="0"/>
+                  <a:t>,       </a:t>
+                </a:r>
+                <a14:m>
+                  <m:oMath xmlns:m="http://schemas.openxmlformats.org/officeDocument/2006/math">
+                    <m:sSubSup>
+                      <m:sSubSupPr>
+                        <m:ctrlPr>
+                          <a:rPr lang="en-US" i="1" dirty="0">
+                            <a:latin typeface="Cambria Math" panose="02040503050406030204" pitchFamily="18" charset="0"/>
+                          </a:rPr>
+                        </m:ctrlPr>
+                      </m:sSubSupPr>
+                      <m:e>
+                        <m:acc>
+                          <m:accPr>
+                            <m:chr m:val="̇"/>
+                            <m:ctrlPr>
+                              <a:rPr lang="en-US" i="1">
+                                <a:latin typeface="Cambria Math" panose="02040503050406030204" pitchFamily="18" charset="0"/>
+                              </a:rPr>
+                            </m:ctrlPr>
+                          </m:accPr>
+                          <m:e>
+                            <m:r>
+                              <a:rPr lang="en-US" i="1">
+                                <a:latin typeface="Cambria Math" panose="02040503050406030204" pitchFamily="18" charset="0"/>
+                              </a:rPr>
+                              <m:t>𝑚</m:t>
+                            </m:r>
+                          </m:e>
+                        </m:acc>
+                      </m:e>
+                      <m:sub>
+                        <m:r>
+                          <a:rPr lang="en-US" i="1" dirty="0">
+                            <a:latin typeface="Cambria Math" panose="02040503050406030204" pitchFamily="18" charset="0"/>
+                          </a:rPr>
+                          <m:t>𝑡𝑜𝑡</m:t>
+                        </m:r>
+                      </m:sub>
+                      <m:sup>
+                        <m:r>
+                          <a:rPr lang="en-US" i="1" dirty="0">
+                            <a:latin typeface="Cambria Math" panose="02040503050406030204" pitchFamily="18" charset="0"/>
+                          </a:rPr>
+                          <m:t>𝑡</m:t>
+                        </m:r>
+                      </m:sup>
+                    </m:sSubSup>
+                  </m:oMath>
+                </a14:m>
+                <a:r>
+                  <a:rPr lang="en-US" i="1" dirty="0"/>
+                  <a:t>= </a:t>
+                </a:r>
+                <a14:m>
+                  <m:oMath xmlns:m="http://schemas.openxmlformats.org/officeDocument/2006/math">
+                    <m:nary>
+                      <m:naryPr>
+                        <m:chr m:val="∑"/>
+                        <m:supHide m:val="on"/>
+                        <m:ctrlPr>
+                          <a:rPr lang="en-US" i="1">
+                            <a:latin typeface="Cambria Math" panose="02040503050406030204" pitchFamily="18" charset="0"/>
+                          </a:rPr>
+                        </m:ctrlPr>
+                      </m:naryPr>
+                      <m:sub>
+                        <m:r>
+                          <m:rPr>
+                            <m:brk m:alnAt="7"/>
+                          </m:rPr>
+                          <a:rPr lang="en-US" i="1">
+                            <a:latin typeface="Cambria Math" panose="02040503050406030204" pitchFamily="18" charset="0"/>
+                          </a:rPr>
+                          <m:t>𝑧</m:t>
+                        </m:r>
+                      </m:sub>
+                      <m:sup/>
+                      <m:e>
+                        <m:sSub>
+                          <m:sSubPr>
+                            <m:ctrlPr>
+                              <a:rPr lang="en-US" i="1">
+                                <a:latin typeface="Cambria Math" panose="02040503050406030204" pitchFamily="18" charset="0"/>
+                              </a:rPr>
+                            </m:ctrlPr>
+                          </m:sSubPr>
+                          <m:e>
+                            <m:acc>
+                              <m:accPr>
+                                <m:chr m:val="̇"/>
+                                <m:ctrlPr>
+                                  <a:rPr lang="en-US" i="1">
+                                    <a:latin typeface="Cambria Math" panose="02040503050406030204" pitchFamily="18" charset="0"/>
+                                  </a:rPr>
+                                </m:ctrlPr>
+                              </m:accPr>
+                              <m:e>
+                                <m:r>
+                                  <a:rPr lang="en-US" i="1">
+                                    <a:latin typeface="Cambria Math" panose="02040503050406030204" pitchFamily="18" charset="0"/>
+                                  </a:rPr>
+                                  <m:t>𝑚</m:t>
+                                </m:r>
+                              </m:e>
+                            </m:acc>
+                          </m:e>
+                          <m:sub>
+                            <m:r>
+                              <a:rPr lang="en-US" i="1">
+                                <a:latin typeface="Cambria Math" panose="02040503050406030204" pitchFamily="18" charset="0"/>
+                              </a:rPr>
+                              <m:t>𝑧</m:t>
+                            </m:r>
+                            <m:r>
+                              <a:rPr lang="en-US" i="1">
+                                <a:latin typeface="Cambria Math" panose="02040503050406030204" pitchFamily="18" charset="0"/>
+                              </a:rPr>
+                              <m:t>,</m:t>
+                            </m:r>
+                            <m:r>
+                              <a:rPr lang="en-US" i="1">
+                                <a:latin typeface="Cambria Math" panose="02040503050406030204" pitchFamily="18" charset="0"/>
+                              </a:rPr>
+                              <m:t>𝑡</m:t>
+                            </m:r>
+                          </m:sub>
+                        </m:sSub>
+                      </m:e>
+                    </m:nary>
+                  </m:oMath>
+                </a14:m>
+                <a:r>
+                  <a:rPr lang="en-US" i="1" dirty="0"/>
+                  <a:t> </a:t>
+                </a:r>
+              </a:p>
+              <a:p>
+                <a:pPr lvl="1"/>
+                <a:endParaRPr lang="en-US" dirty="0"/>
+              </a:p>
+              <a:p>
+                <a:r>
+                  <a:rPr lang="en-US" dirty="0"/>
+                  <a:t>Objective </a:t>
+                </a:r>
+              </a:p>
+              <a:p>
+                <a:pPr lvl="1"/>
+                <a:r>
+                  <a:rPr lang="en-US" dirty="0"/>
+                  <a:t>Minimize </a:t>
+                </a:r>
+                <a14:m>
+                  <m:oMath xmlns:m="http://schemas.openxmlformats.org/officeDocument/2006/math">
+                    <m:sSubSup>
+                      <m:sSubSupPr>
+                        <m:ctrlPr>
+                          <a:rPr lang="en-US" i="1" dirty="0">
+                            <a:latin typeface="Cambria Math" panose="02040503050406030204" pitchFamily="18" charset="0"/>
+                          </a:rPr>
+                        </m:ctrlPr>
+                      </m:sSubSupPr>
+                      <m:e>
+                        <m:r>
+                          <a:rPr lang="en-US" i="1" dirty="0">
+                            <a:latin typeface="Cambria Math" panose="02040503050406030204" pitchFamily="18" charset="0"/>
+                          </a:rPr>
+                          <m:t>𝑃</m:t>
+                        </m:r>
+                      </m:e>
+                      <m:sub>
+                        <m:r>
+                          <a:rPr lang="en-US" i="1" dirty="0">
+                            <a:latin typeface="Cambria Math" panose="02040503050406030204" pitchFamily="18" charset="0"/>
+                          </a:rPr>
+                          <m:t>𝑓𝑎𝑛</m:t>
+                        </m:r>
+                      </m:sub>
+                      <m:sup>
+                        <m:r>
+                          <a:rPr lang="en-US" i="1" dirty="0">
+                            <a:latin typeface="Cambria Math" panose="02040503050406030204" pitchFamily="18" charset="0"/>
+                          </a:rPr>
+                          <m:t>𝑡</m:t>
+                        </m:r>
+                      </m:sup>
+                    </m:sSubSup>
+                    <m:r>
+                      <a:rPr lang="en-US" b="0" i="1" dirty="0" smtClean="0">
+                        <a:latin typeface="Cambria Math" panose="02040503050406030204" pitchFamily="18" charset="0"/>
+                      </a:rPr>
+                      <m:t>+</m:t>
+                    </m:r>
+                    <m:sSubSup>
+                      <m:sSubSupPr>
+                        <m:ctrlPr>
+                          <a:rPr lang="en-US" i="1" dirty="0">
+                            <a:latin typeface="Cambria Math" panose="02040503050406030204" pitchFamily="18" charset="0"/>
+                          </a:rPr>
+                        </m:ctrlPr>
+                      </m:sSubSupPr>
+                      <m:e>
+                        <m:r>
+                          <a:rPr lang="en-US" i="1" dirty="0">
+                            <a:latin typeface="Cambria Math" panose="02040503050406030204" pitchFamily="18" charset="0"/>
+                          </a:rPr>
+                          <m:t>𝑃</m:t>
+                        </m:r>
+                      </m:e>
+                      <m:sub>
+                        <m:r>
+                          <a:rPr lang="en-US" i="1" dirty="0">
+                            <a:latin typeface="Cambria Math" panose="02040503050406030204" pitchFamily="18" charset="0"/>
+                          </a:rPr>
+                          <m:t>𝑐h𝑖𝑙𝑙𝑒𝑟</m:t>
+                        </m:r>
+                      </m:sub>
+                      <m:sup>
+                        <m:r>
+                          <a:rPr lang="en-US" i="1" dirty="0">
+                            <a:latin typeface="Cambria Math" panose="02040503050406030204" pitchFamily="18" charset="0"/>
+                          </a:rPr>
+                          <m:t>𝑡</m:t>
+                        </m:r>
+                      </m:sup>
+                    </m:sSubSup>
+                  </m:oMath>
+                </a14:m>
+                <a:endParaRPr lang="en-US" dirty="0"/>
+              </a:p>
+              <a:p>
+                <a:pPr lvl="1"/>
+                <a:endParaRPr lang="en-US" b="0" i="0" dirty="0">
+                  <a:latin typeface="Cambria Math" panose="02040503050406030204" pitchFamily="18" charset="0"/>
+                </a:endParaRPr>
+              </a:p>
+            </p:txBody>
+          </p:sp>
+        </mc:Choice>
+        <mc:Fallback>
+          <p:sp>
+            <p:nvSpPr>
+              <p:cNvPr id="3" name="Content Placeholder 2">
+                <a:extLst>
+                  <a:ext uri="{FF2B5EF4-FFF2-40B4-BE49-F238E27FC236}">
+                    <a16:creationId xmlns:a16="http://schemas.microsoft.com/office/drawing/2014/main" id="{ECB9528C-D5BB-914D-9A7C-C52C1CB55AF3}"/>
+                  </a:ext>
+                </a:extLst>
+              </p:cNvPr>
+              <p:cNvSpPr>
+                <a:spLocks noGrp="1" noRot="1" noChangeAspect="1" noMove="1" noResize="1" noEditPoints="1" noAdjustHandles="1" noChangeArrowheads="1" noChangeShapeType="1" noTextEdit="1"/>
+              </p:cNvSpPr>
+              <p:nvPr>
+                <p:ph idx="1"/>
+              </p:nvPr>
+            </p:nvSpPr>
+            <p:spPr>
+              <a:xfrm>
+                <a:off x="838200" y="1365662"/>
+                <a:ext cx="10515600" cy="4811301"/>
+              </a:xfrm>
+              <a:blipFill>
+                <a:blip r:embed="rId3"/>
+                <a:stretch>
+                  <a:fillRect l="-965" t="-2632" b="-526"/>
+                </a:stretch>
+              </a:blipFill>
+            </p:spPr>
+            <p:txBody>
+              <a:bodyPr/>
+              <a:lstStyle/>
+              <a:p>
+                <a:r>
+                  <a:rPr lang="en-US">
+                    <a:noFill/>
+                  </a:rPr>
+                  <a:t> </a:t>
+                </a:r>
+              </a:p>
+            </p:txBody>
+          </p:sp>
+        </mc:Fallback>
+      </mc:AlternateContent>
+    </p:spTree>
+    <p:extLst>
+      <p:ext uri="{BB962C8B-B14F-4D97-AF65-F5344CB8AC3E}">
+        <p14:creationId xmlns:p14="http://schemas.microsoft.com/office/powerpoint/2010/main" val="2834138082"/>
+      </p:ext>
+    </p:extLst>
+  </p:cSld>
+  <p:clrMapOvr>
+    <a:masterClrMapping/>
+  </p:clrMapOvr>
+</p:sld>
+</file>
+
+<file path=ppt/slides/slide3.xml><?xml version="1.0" encoding="utf-8"?>
 <p:sld xmlns:a="http://schemas.openxmlformats.org/drawingml/2006/main" xmlns:r="http://schemas.openxmlformats.org/officeDocument/2006/relationships" xmlns:p="http://schemas.openxmlformats.org/presentationml/2006/main">
   <p:cSld>
     <p:spTree>
@@ -7496,7 +9403,7 @@
 </p:sld>
 </file>
 
-<file path=ppt/slides/slide3.xml><?xml version="1.0" encoding="utf-8"?>
+<file path=ppt/slides/slide4.xml><?xml version="1.0" encoding="utf-8"?>
 <p:sld xmlns:a="http://schemas.openxmlformats.org/drawingml/2006/main" xmlns:r="http://schemas.openxmlformats.org/officeDocument/2006/relationships" xmlns:p="http://schemas.openxmlformats.org/presentationml/2006/main">
   <p:cSld>
     <p:spTree>
@@ -7721,7 +9628,7 @@
 </p:sld>
 </file>
 
-<file path=ppt/slides/slide4.xml><?xml version="1.0" encoding="utf-8"?>
+<file path=ppt/slides/slide5.xml><?xml version="1.0" encoding="utf-8"?>
 <p:sld xmlns:a="http://schemas.openxmlformats.org/drawingml/2006/main" xmlns:r="http://schemas.openxmlformats.org/officeDocument/2006/relationships" xmlns:p="http://schemas.openxmlformats.org/presentationml/2006/main" show="0">
   <p:cSld>
     <p:spTree>
@@ -11194,7 +13101,7 @@
 </p:sld>
 </file>
 
-<file path=ppt/slides/slide5.xml><?xml version="1.0" encoding="utf-8"?>
+<file path=ppt/slides/slide6.xml><?xml version="1.0" encoding="utf-8"?>
 <p:sld xmlns:a="http://schemas.openxmlformats.org/drawingml/2006/main" xmlns:r="http://schemas.openxmlformats.org/officeDocument/2006/relationships" xmlns:p="http://schemas.openxmlformats.org/presentationml/2006/main" show="0">
   <p:cSld>
     <p:spTree>
@@ -12104,7 +14011,7 @@
 </p:sld>
 </file>
 
-<file path=ppt/slides/slide6.xml><?xml version="1.0" encoding="utf-8"?>
+<file path=ppt/slides/slide7.xml><?xml version="1.0" encoding="utf-8"?>
 <p:sld xmlns:a="http://schemas.openxmlformats.org/drawingml/2006/main" xmlns:r="http://schemas.openxmlformats.org/officeDocument/2006/relationships" xmlns:p="http://schemas.openxmlformats.org/presentationml/2006/main" show="0">
   <p:cSld>
     <p:spTree>
@@ -16377,7 +18284,7 @@
 </p:sld>
 </file>
 
-<file path=ppt/slides/slide7.xml><?xml version="1.0" encoding="utf-8"?>
+<file path=ppt/slides/slide8.xml><?xml version="1.0" encoding="utf-8"?>
 <p:sld xmlns:a="http://schemas.openxmlformats.org/drawingml/2006/main" xmlns:r="http://schemas.openxmlformats.org/officeDocument/2006/relationships" xmlns:p="http://schemas.openxmlformats.org/presentationml/2006/main" show="0">
   <p:cSld>
     <p:spTree>
@@ -18562,7 +20469,7 @@
 </p:sld>
 </file>
 
-<file path=ppt/slides/slide8.xml><?xml version="1.0" encoding="utf-8"?>
+<file path=ppt/slides/slide9.xml><?xml version="1.0" encoding="utf-8"?>
 <p:sld xmlns:a="http://schemas.openxmlformats.org/drawingml/2006/main" xmlns:r="http://schemas.openxmlformats.org/officeDocument/2006/relationships" xmlns:p="http://schemas.openxmlformats.org/presentationml/2006/main" show="0">
   <p:cSld>
     <p:spTree>

</xml_diff>